<commit_message>
ppt mobil resz valtozasok
</commit_message>
<xml_diff>
--- a/TNote_presentation.pptx
+++ b/TNote_presentation.pptx
@@ -10409,7 +10409,7 @@
         <p:spPr>
           <a:xfrm>
             <a:off x="2900218" y="2238194"/>
-            <a:ext cx="7914968" cy="1318181"/>
+            <a:ext cx="7914968" cy="2610843"/>
           </a:xfrm>
           <a:prstGeom prst="rect">
             <a:avLst/>
@@ -10467,6 +10467,53 @@
               </a:rPr>
               <a:t> design</a:t>
             </a:r>
+          </a:p>
+          <a:p>
+            <a:pPr marL="742950" lvl="1" indent="-285750">
+              <a:lnSpc>
+                <a:spcPct val="150000"/>
+              </a:lnSpc>
+              <a:buFont typeface="Arial" panose="020B0604020202020204" pitchFamily="34" charset="0"/>
+              <a:buChar char="•"/>
+            </a:pPr>
+            <a:r>
+              <a:rPr lang="en-GB" sz="2800" dirty="0" err="1">
+                <a:solidFill>
+                  <a:schemeClr val="bg1"/>
+                </a:solidFill>
+              </a:rPr>
+              <a:t>Egyszer</a:t>
+            </a:r>
+            <a:r>
+              <a:rPr lang="hu-HU" sz="2800" dirty="0">
+                <a:solidFill>
+                  <a:schemeClr val="bg1"/>
+                </a:solidFill>
+              </a:rPr>
+              <a:t>ű</a:t>
+            </a:r>
+          </a:p>
+          <a:p>
+            <a:pPr marL="742950" lvl="1" indent="-285750">
+              <a:lnSpc>
+                <a:spcPct val="150000"/>
+              </a:lnSpc>
+              <a:buFont typeface="Arial" panose="020B0604020202020204" pitchFamily="34" charset="0"/>
+              <a:buChar char="•"/>
+            </a:pPr>
+            <a:r>
+              <a:rPr lang="hu-HU" sz="2800" dirty="0">
+                <a:solidFill>
+                  <a:schemeClr val="bg1"/>
+                </a:solidFill>
+              </a:rPr>
+              <a:t>Letisztult</a:t>
+            </a:r>
+            <a:endParaRPr lang="en-GB" sz="2800" dirty="0">
+              <a:solidFill>
+                <a:schemeClr val="bg1"/>
+              </a:solidFill>
+            </a:endParaRPr>
           </a:p>
         </p:txBody>
       </p:sp>
@@ -11566,7 +11613,7 @@
         <p:spPr>
           <a:xfrm>
             <a:off x="2900218" y="2238194"/>
-            <a:ext cx="7914968" cy="1318181"/>
+            <a:ext cx="7914968" cy="2610843"/>
           </a:xfrm>
           <a:prstGeom prst="rect">
             <a:avLst/>
@@ -11656,6 +11703,50 @@
               </a:rPr>
               <a:t> design</a:t>
             </a:r>
+            <a:endParaRPr lang="hu-HU" sz="2800" dirty="0">
+              <a:solidFill>
+                <a:schemeClr val="bg1"/>
+              </a:solidFill>
+            </a:endParaRPr>
+          </a:p>
+          <a:p>
+            <a:pPr marL="742950" lvl="1" indent="-285750">
+              <a:lnSpc>
+                <a:spcPct val="150000"/>
+              </a:lnSpc>
+              <a:buFont typeface="Arial" panose="020B0604020202020204" pitchFamily="34" charset="0"/>
+              <a:buChar char="•"/>
+            </a:pPr>
+            <a:r>
+              <a:rPr lang="hu-HU" sz="2800" dirty="0">
+                <a:solidFill>
+                  <a:schemeClr val="bg1"/>
+                </a:solidFill>
+              </a:rPr>
+              <a:t>Színek</a:t>
+            </a:r>
+          </a:p>
+          <a:p>
+            <a:pPr marL="742950" lvl="1" indent="-285750">
+              <a:lnSpc>
+                <a:spcPct val="150000"/>
+              </a:lnSpc>
+              <a:buFont typeface="Arial" panose="020B0604020202020204" pitchFamily="34" charset="0"/>
+              <a:buChar char="•"/>
+            </a:pPr>
+            <a:r>
+              <a:rPr lang="hu-HU" sz="2800" dirty="0" err="1">
+                <a:solidFill>
+                  <a:schemeClr val="bg1"/>
+                </a:solidFill>
+              </a:rPr>
+              <a:t>Logo</a:t>
+            </a:r>
+            <a:endParaRPr lang="en-GB" sz="2800" dirty="0">
+              <a:solidFill>
+                <a:schemeClr val="bg1"/>
+              </a:solidFill>
+            </a:endParaRPr>
           </a:p>
         </p:txBody>
       </p:sp>
@@ -14159,13 +14250,13 @@
   <p:clrMapOvr>
     <a:masterClrMapping/>
   </p:clrMapOvr>
-  <mc:AlternateContent xmlns:mc="http://schemas.openxmlformats.org/markup-compatibility/2006">
-    <mc:Choice xmlns:p159="http://schemas.microsoft.com/office/powerpoint/2015/09/main" Requires="p159">
+  <mc:AlternateContent xmlns:mc="http://schemas.openxmlformats.org/markup-compatibility/2006" xmlns:p159="http://schemas.microsoft.com/office/powerpoint/2015/09/main">
+    <mc:Choice Requires="p159">
       <p:transition spd="med">
         <p159:morph option="byObject"/>
       </p:transition>
     </mc:Choice>
-    <mc:Fallback>
+    <mc:Fallback xmlns="">
       <p:transition spd="med">
         <p:fade/>
       </p:transition>
@@ -15295,13 +15386,13 @@
   <p:clrMapOvr>
     <a:masterClrMapping/>
   </p:clrMapOvr>
-  <mc:AlternateContent xmlns:mc="http://schemas.openxmlformats.org/markup-compatibility/2006">
-    <mc:Choice xmlns:p159="http://schemas.microsoft.com/office/powerpoint/2015/09/main" Requires="p159">
+  <mc:AlternateContent xmlns:mc="http://schemas.openxmlformats.org/markup-compatibility/2006" xmlns:p159="http://schemas.microsoft.com/office/powerpoint/2015/09/main">
+    <mc:Choice Requires="p159">
       <p:transition spd="med">
         <p159:morph option="byObject"/>
       </p:transition>
     </mc:Choice>
-    <mc:Fallback>
+    <mc:Fallback xmlns="">
       <p:transition spd="med">
         <p:fade/>
       </p:transition>
@@ -16453,13 +16544,13 @@
   <p:clrMapOvr>
     <a:masterClrMapping/>
   </p:clrMapOvr>
-  <mc:AlternateContent xmlns:mc="http://schemas.openxmlformats.org/markup-compatibility/2006">
-    <mc:Choice xmlns:p159="http://schemas.microsoft.com/office/powerpoint/2015/09/main" Requires="p159">
+  <mc:AlternateContent xmlns:mc="http://schemas.openxmlformats.org/markup-compatibility/2006" xmlns:p159="http://schemas.microsoft.com/office/powerpoint/2015/09/main">
+    <mc:Choice Requires="p159">
       <p:transition spd="med">
         <p159:morph option="byObject"/>
       </p:transition>
     </mc:Choice>
-    <mc:Fallback>
+    <mc:Fallback xmlns="">
       <p:transition spd="med">
         <p:fade/>
       </p:transition>

</xml_diff>